<commit_message>
AGAIN updated fmm diagram
</commit_message>
<xml_diff>
--- a/figures/fmm-diagram.pptx
+++ b/figures/fmm-diagram.pptx
@@ -3121,8 +3121,8 @@
         </p:blipFill>
         <p:spPr>
           <a:xfrm>
-            <a:off x="15822666" y="319859"/>
-            <a:ext cx="1100626" cy="650369"/>
+            <a:off x="16013052" y="16880"/>
+            <a:ext cx="892053" cy="527122"/>
           </a:xfrm>
           <a:prstGeom prst="rect">
             <a:avLst/>
@@ -4055,7 +4055,7 @@
         </p:nvSpPr>
         <p:spPr>
           <a:xfrm>
-            <a:off x="2959575" y="369113"/>
+            <a:off x="2913656" y="-18985"/>
             <a:ext cx="2047832" cy="707886"/>
           </a:xfrm>
           <a:prstGeom prst="rect">
@@ -4081,54 +4081,6 @@
           </a:p>
         </p:txBody>
       </p:sp>
-      <p:sp>
-        <p:nvSpPr>
-          <p:cNvPr id="72" name="TextBox 71">
-            <a:extLst>
-              <a:ext uri="{FF2B5EF4-FFF2-40B4-BE49-F238E27FC236}">
-                <a16:creationId xmlns:a16="http://schemas.microsoft.com/office/drawing/2014/main" id="{BE2129A3-0739-AF8E-DB1D-BED539C5702F}"/>
-              </a:ext>
-            </a:extLst>
-          </p:cNvPr>
-          <p:cNvSpPr txBox="1"/>
-          <p:nvPr/>
-        </p:nvSpPr>
-        <p:spPr>
-          <a:xfrm>
-            <a:off x="438672" y="274349"/>
-            <a:ext cx="1719937" cy="784830"/>
-          </a:xfrm>
-          <a:prstGeom prst="rect">
-            <a:avLst/>
-          </a:prstGeom>
-          <a:noFill/>
-        </p:spPr>
-        <p:txBody>
-          <a:bodyPr wrap="square" rtlCol="0">
-            <a:spAutoFit/>
-          </a:bodyPr>
-          <a:lstStyle/>
-          <a:p>
-            <a:pPr algn="ctr"/>
-            <a:r>
-              <a:rPr lang="en-GB" sz="4500" b="1" i="1" dirty="0">
-                <a:latin typeface="CMU Serif BoldItalic" panose="02000603000000000000" pitchFamily="2" charset="0"/>
-                <a:ea typeface="CMU Serif BoldItalic" panose="02000603000000000000" pitchFamily="2" charset="0"/>
-                <a:cs typeface="CMU Serif BoldItalic" panose="02000603000000000000" pitchFamily="2" charset="0"/>
-              </a:rPr>
-              <a:t>y</a:t>
-            </a:r>
-            <a:r>
-              <a:rPr lang="en-GB" sz="4500" i="1" dirty="0">
-                <a:latin typeface="CMU Serif" panose="02000603000000000000" pitchFamily="2" charset="0"/>
-                <a:ea typeface="CMU Serif" panose="02000603000000000000" pitchFamily="2" charset="0"/>
-                <a:cs typeface="CMU Serif" panose="02000603000000000000" pitchFamily="2" charset="0"/>
-              </a:rPr>
-              <a:t>(t)</a:t>
-            </a:r>
-          </a:p>
-        </p:txBody>
-      </p:sp>
       <p:pic>
         <p:nvPicPr>
           <p:cNvPr id="79" name="Graphic 78">
@@ -4157,8 +4109,8 @@
         </p:blipFill>
         <p:spPr>
           <a:xfrm>
-            <a:off x="5771668" y="366774"/>
-            <a:ext cx="1017441" cy="551114"/>
+            <a:off x="5923345" y="69416"/>
+            <a:ext cx="991716" cy="537180"/>
           </a:xfrm>
           <a:prstGeom prst="rect">
             <a:avLst/>
@@ -4806,7 +4758,7 @@
         </p:nvSpPr>
         <p:spPr>
           <a:xfrm>
-            <a:off x="8992713" y="304251"/>
+            <a:off x="8977099" y="-60307"/>
             <a:ext cx="2047832" cy="784830"/>
           </a:xfrm>
           <a:prstGeom prst="rect">
@@ -5742,172 +5694,400 @@
       </p:pic>
       <p:sp>
         <p:nvSpPr>
-          <p:cNvPr id="8" name="TextBox 7">
-            <a:extLst>
-              <a:ext uri="{FF2B5EF4-FFF2-40B4-BE49-F238E27FC236}">
-                <a16:creationId xmlns:a16="http://schemas.microsoft.com/office/drawing/2014/main" id="{D73ADA2D-0005-A9B2-47A2-53E3CE09F431}"/>
-              </a:ext>
-            </a:extLst>
-          </p:cNvPr>
-          <p:cNvSpPr txBox="1"/>
-          <p:nvPr/>
-        </p:nvSpPr>
-        <p:spPr>
-          <a:xfrm>
-            <a:off x="12505367" y="249916"/>
-            <a:ext cx="1719937" cy="784830"/>
+          <p:cNvPr id="13" name="Left Brace 12">
+            <a:extLst>
+              <a:ext uri="{FF2B5EF4-FFF2-40B4-BE49-F238E27FC236}">
+                <a16:creationId xmlns:a16="http://schemas.microsoft.com/office/drawing/2014/main" id="{20E6C45F-00C3-6CC9-570D-66ED0549E5C0}"/>
+              </a:ext>
+            </a:extLst>
+          </p:cNvPr>
+          <p:cNvSpPr/>
+          <p:nvPr/>
+        </p:nvSpPr>
+        <p:spPr>
+          <a:xfrm rot="5400000">
+            <a:off x="9877635" y="-1288865"/>
+            <a:ext cx="380470" cy="4094878"/>
+          </a:xfrm>
+          <a:prstGeom prst="leftBrace">
+            <a:avLst/>
+          </a:prstGeom>
+          <a:ln w="12700">
+            <a:solidFill>
+              <a:schemeClr val="bg2">
+                <a:lumMod val="25000"/>
+              </a:schemeClr>
+            </a:solidFill>
+          </a:ln>
+        </p:spPr>
+        <p:style>
+          <a:lnRef idx="1">
+            <a:schemeClr val="dk1"/>
+          </a:lnRef>
+          <a:fillRef idx="0">
+            <a:schemeClr val="dk1"/>
+          </a:fillRef>
+          <a:effectRef idx="0">
+            <a:schemeClr val="dk1"/>
+          </a:effectRef>
+          <a:fontRef idx="minor">
+            <a:schemeClr val="tx1"/>
+          </a:fontRef>
+        </p:style>
+        <p:txBody>
+          <a:bodyPr rtlCol="0" anchor="ctr"/>
+          <a:lstStyle/>
+          <a:p>
+            <a:pPr algn="ctr"/>
+            <a:endParaRPr lang="en-GB"/>
+          </a:p>
+        </p:txBody>
+      </p:sp>
+      <p:sp>
+        <p:nvSpPr>
+          <p:cNvPr id="16" name="Left Brace 15">
+            <a:extLst>
+              <a:ext uri="{FF2B5EF4-FFF2-40B4-BE49-F238E27FC236}">
+                <a16:creationId xmlns:a16="http://schemas.microsoft.com/office/drawing/2014/main" id="{3AEE1284-367B-5746-C99C-34F0FD58DD36}"/>
+              </a:ext>
+            </a:extLst>
+          </p:cNvPr>
+          <p:cNvSpPr/>
+          <p:nvPr/>
+        </p:nvSpPr>
+        <p:spPr>
+          <a:xfrm rot="5400000">
+            <a:off x="13086418" y="-101395"/>
+            <a:ext cx="401565" cy="1719937"/>
+          </a:xfrm>
+          <a:prstGeom prst="leftBrace">
+            <a:avLst/>
+          </a:prstGeom>
+          <a:ln w="12700">
+            <a:solidFill>
+              <a:schemeClr val="bg2">
+                <a:lumMod val="25000"/>
+              </a:schemeClr>
+            </a:solidFill>
+          </a:ln>
+        </p:spPr>
+        <p:style>
+          <a:lnRef idx="1">
+            <a:schemeClr val="dk1"/>
+          </a:lnRef>
+          <a:fillRef idx="0">
+            <a:schemeClr val="dk1"/>
+          </a:fillRef>
+          <a:effectRef idx="0">
+            <a:schemeClr val="dk1"/>
+          </a:effectRef>
+          <a:fontRef idx="minor">
+            <a:schemeClr val="tx1"/>
+          </a:fontRef>
+        </p:style>
+        <p:txBody>
+          <a:bodyPr rtlCol="0" anchor="ctr"/>
+          <a:lstStyle/>
+          <a:p>
+            <a:pPr algn="ctr"/>
+            <a:endParaRPr lang="en-GB"/>
+          </a:p>
+        </p:txBody>
+      </p:sp>
+      <p:sp>
+        <p:nvSpPr>
+          <p:cNvPr id="18" name="Left Brace 17">
+            <a:extLst>
+              <a:ext uri="{FF2B5EF4-FFF2-40B4-BE49-F238E27FC236}">
+                <a16:creationId xmlns:a16="http://schemas.microsoft.com/office/drawing/2014/main" id="{B27FED24-1928-2862-BBAA-3A0C2CCDB423}"/>
+              </a:ext>
+            </a:extLst>
+          </p:cNvPr>
+          <p:cNvSpPr/>
+          <p:nvPr/>
+        </p:nvSpPr>
+        <p:spPr>
+          <a:xfrm rot="5400000">
+            <a:off x="16191758" y="-196906"/>
+            <a:ext cx="404808" cy="1886622"/>
+          </a:xfrm>
+          <a:prstGeom prst="leftBrace">
+            <a:avLst/>
+          </a:prstGeom>
+          <a:ln w="12700">
+            <a:solidFill>
+              <a:schemeClr val="bg2">
+                <a:lumMod val="25000"/>
+              </a:schemeClr>
+            </a:solidFill>
+          </a:ln>
+        </p:spPr>
+        <p:style>
+          <a:lnRef idx="1">
+            <a:schemeClr val="dk1"/>
+          </a:lnRef>
+          <a:fillRef idx="0">
+            <a:schemeClr val="dk1"/>
+          </a:fillRef>
+          <a:effectRef idx="0">
+            <a:schemeClr val="dk1"/>
+          </a:effectRef>
+          <a:fontRef idx="minor">
+            <a:schemeClr val="tx1"/>
+          </a:fontRef>
+        </p:style>
+        <p:txBody>
+          <a:bodyPr rtlCol="0" anchor="ctr"/>
+          <a:lstStyle/>
+          <a:p>
+            <a:pPr algn="ctr"/>
+            <a:endParaRPr lang="en-GB"/>
+          </a:p>
+        </p:txBody>
+      </p:sp>
+      <p:sp>
+        <p:nvSpPr>
+          <p:cNvPr id="34" name="Left Brace 33">
+            <a:extLst>
+              <a:ext uri="{FF2B5EF4-FFF2-40B4-BE49-F238E27FC236}">
+                <a16:creationId xmlns:a16="http://schemas.microsoft.com/office/drawing/2014/main" id="{A500693C-9372-903F-65F8-40A32F3BDA69}"/>
+              </a:ext>
+            </a:extLst>
+          </p:cNvPr>
+          <p:cNvSpPr/>
+          <p:nvPr/>
+        </p:nvSpPr>
+        <p:spPr>
+          <a:xfrm rot="5400000">
+            <a:off x="6029361" y="-161479"/>
+            <a:ext cx="401565" cy="1780145"/>
+          </a:xfrm>
+          <a:prstGeom prst="leftBrace">
+            <a:avLst/>
+          </a:prstGeom>
+          <a:ln w="12700">
+            <a:solidFill>
+              <a:schemeClr val="bg2">
+                <a:lumMod val="25000"/>
+              </a:schemeClr>
+            </a:solidFill>
+          </a:ln>
+        </p:spPr>
+        <p:style>
+          <a:lnRef idx="1">
+            <a:schemeClr val="dk1"/>
+          </a:lnRef>
+          <a:fillRef idx="0">
+            <a:schemeClr val="dk1"/>
+          </a:fillRef>
+          <a:effectRef idx="0">
+            <a:schemeClr val="dk1"/>
+          </a:effectRef>
+          <a:fontRef idx="minor">
+            <a:schemeClr val="tx1"/>
+          </a:fontRef>
+        </p:style>
+        <p:txBody>
+          <a:bodyPr rtlCol="0" anchor="ctr"/>
+          <a:lstStyle/>
+          <a:p>
+            <a:pPr algn="ctr"/>
+            <a:endParaRPr lang="en-GB">
+              <a:solidFill>
+                <a:schemeClr val="bg2">
+                  <a:lumMod val="50000"/>
+                </a:schemeClr>
+              </a:solidFill>
+            </a:endParaRPr>
+          </a:p>
+        </p:txBody>
+      </p:sp>
+      <p:sp>
+        <p:nvSpPr>
+          <p:cNvPr id="36" name="Left Brace 35">
+            <a:extLst>
+              <a:ext uri="{FF2B5EF4-FFF2-40B4-BE49-F238E27FC236}">
+                <a16:creationId xmlns:a16="http://schemas.microsoft.com/office/drawing/2014/main" id="{2B6D5801-D354-EB4D-FB66-155B9A5619ED}"/>
+              </a:ext>
+            </a:extLst>
+          </p:cNvPr>
+          <p:cNvSpPr/>
+          <p:nvPr/>
+        </p:nvSpPr>
+        <p:spPr>
+          <a:xfrm rot="5400000">
+            <a:off x="3733268" y="-408471"/>
+            <a:ext cx="401565" cy="2281463"/>
+          </a:xfrm>
+          <a:prstGeom prst="leftBrace">
+            <a:avLst/>
+          </a:prstGeom>
+          <a:ln w="12700">
+            <a:solidFill>
+              <a:schemeClr val="bg2">
+                <a:lumMod val="25000"/>
+              </a:schemeClr>
+            </a:solidFill>
+          </a:ln>
+        </p:spPr>
+        <p:style>
+          <a:lnRef idx="1">
+            <a:schemeClr val="dk1"/>
+          </a:lnRef>
+          <a:fillRef idx="0">
+            <a:schemeClr val="dk1"/>
+          </a:fillRef>
+          <a:effectRef idx="0">
+            <a:schemeClr val="dk1"/>
+          </a:effectRef>
+          <a:fontRef idx="minor">
+            <a:schemeClr val="tx1"/>
+          </a:fontRef>
+        </p:style>
+        <p:txBody>
+          <a:bodyPr rtlCol="0" anchor="ctr"/>
+          <a:lstStyle/>
+          <a:p>
+            <a:pPr algn="ctr"/>
+            <a:endParaRPr lang="en-GB">
+              <a:solidFill>
+                <a:schemeClr val="bg2">
+                  <a:lumMod val="50000"/>
+                </a:schemeClr>
+              </a:solidFill>
+            </a:endParaRPr>
+          </a:p>
+        </p:txBody>
+      </p:sp>
+      <p:sp>
+        <p:nvSpPr>
+          <p:cNvPr id="37" name="Left Brace 36">
+            <a:extLst>
+              <a:ext uri="{FF2B5EF4-FFF2-40B4-BE49-F238E27FC236}">
+                <a16:creationId xmlns:a16="http://schemas.microsoft.com/office/drawing/2014/main" id="{5A90FA2B-3577-BA8A-6BE1-A8A5519B6D1D}"/>
+              </a:ext>
+            </a:extLst>
+          </p:cNvPr>
+          <p:cNvSpPr/>
+          <p:nvPr/>
+        </p:nvSpPr>
+        <p:spPr>
+          <a:xfrm rot="5400000">
+            <a:off x="1036767" y="-208749"/>
+            <a:ext cx="401565" cy="1949612"/>
+          </a:xfrm>
+          <a:prstGeom prst="leftBrace">
+            <a:avLst/>
+          </a:prstGeom>
+          <a:ln w="12700">
+            <a:solidFill>
+              <a:schemeClr val="bg2">
+                <a:lumMod val="25000"/>
+              </a:schemeClr>
+            </a:solidFill>
+          </a:ln>
+        </p:spPr>
+        <p:style>
+          <a:lnRef idx="1">
+            <a:schemeClr val="dk1"/>
+          </a:lnRef>
+          <a:fillRef idx="0">
+            <a:schemeClr val="dk1"/>
+          </a:fillRef>
+          <a:effectRef idx="0">
+            <a:schemeClr val="dk1"/>
+          </a:effectRef>
+          <a:fontRef idx="minor">
+            <a:schemeClr val="tx1"/>
+          </a:fontRef>
+        </p:style>
+        <p:txBody>
+          <a:bodyPr rtlCol="0" anchor="ctr"/>
+          <a:lstStyle/>
+          <a:p>
+            <a:pPr algn="ctr"/>
+            <a:endParaRPr lang="en-GB">
+              <a:solidFill>
+                <a:schemeClr val="bg2">
+                  <a:lumMod val="50000"/>
+                </a:schemeClr>
+              </a:solidFill>
+            </a:endParaRPr>
+          </a:p>
+        </p:txBody>
+      </p:sp>
+      <p:pic>
+        <p:nvPicPr>
+          <p:cNvPr id="39" name="Graphic 38">
+            <a:extLst>
+              <a:ext uri="{FF2B5EF4-FFF2-40B4-BE49-F238E27FC236}">
+                <a16:creationId xmlns:a16="http://schemas.microsoft.com/office/drawing/2014/main" id="{C812DAE0-D816-2915-43D1-109F2D07B237}"/>
+              </a:ext>
+            </a:extLst>
+          </p:cNvPr>
+          <p:cNvPicPr>
+            <a:picLocks noChangeAspect="1"/>
+          </p:cNvPicPr>
+          <p:nvPr/>
+        </p:nvPicPr>
+        <p:blipFill>
+          <a:blip r:embed="rId18">
+            <a:extLst>
+              <a:ext uri="{96DAC541-7B7A-43D3-8B79-37D633B846F1}">
+                <asvg:svgBlip xmlns:asvg="http://schemas.microsoft.com/office/drawing/2016/SVG/main" r:embed="rId19"/>
+              </a:ext>
+            </a:extLst>
+          </a:blip>
+          <a:stretch>
+            <a:fillRect/>
+          </a:stretch>
+        </p:blipFill>
+        <p:spPr>
+          <a:xfrm>
+            <a:off x="841774" y="82771"/>
+            <a:ext cx="897212" cy="485990"/>
           </a:xfrm>
           <a:prstGeom prst="rect">
             <a:avLst/>
           </a:prstGeom>
-          <a:noFill/>
-        </p:spPr>
-        <p:txBody>
-          <a:bodyPr wrap="square" rtlCol="0">
-            <a:spAutoFit/>
-          </a:bodyPr>
-          <a:lstStyle/>
-          <a:p>
-            <a:pPr algn="ctr"/>
-            <a:r>
-              <a:rPr lang="en-GB" sz="4500" b="1" i="1" dirty="0">
-                <a:latin typeface="CMU Serif BoldItalic" panose="02000603000000000000" pitchFamily="2" charset="0"/>
-                <a:ea typeface="CMU Serif BoldItalic" panose="02000603000000000000" pitchFamily="2" charset="0"/>
-                <a:cs typeface="CMU Serif BoldItalic" panose="02000603000000000000" pitchFamily="2" charset="0"/>
-              </a:rPr>
-              <a:t>u</a:t>
-            </a:r>
-            <a:r>
-              <a:rPr lang="en-GB" sz="4500" i="1" dirty="0">
-                <a:latin typeface="CMU Serif" panose="02000603000000000000" pitchFamily="2" charset="0"/>
-                <a:ea typeface="CMU Serif" panose="02000603000000000000" pitchFamily="2" charset="0"/>
-                <a:cs typeface="CMU Serif" panose="02000603000000000000" pitchFamily="2" charset="0"/>
-              </a:rPr>
-              <a:t>(t)</a:t>
-            </a:r>
-          </a:p>
-        </p:txBody>
-      </p:sp>
-      <p:sp>
-        <p:nvSpPr>
-          <p:cNvPr id="9" name="TextBox 8">
-            <a:extLst>
-              <a:ext uri="{FF2B5EF4-FFF2-40B4-BE49-F238E27FC236}">
-                <a16:creationId xmlns:a16="http://schemas.microsoft.com/office/drawing/2014/main" id="{C7A60CB0-B050-22BF-3546-7412F009C101}"/>
-              </a:ext>
-            </a:extLst>
-          </p:cNvPr>
-          <p:cNvSpPr txBox="1"/>
-          <p:nvPr/>
-        </p:nvSpPr>
-        <p:spPr>
-          <a:xfrm>
-            <a:off x="2097454" y="403436"/>
-            <a:ext cx="832760" cy="630942"/>
+        </p:spPr>
+      </p:pic>
+      <p:pic>
+        <p:nvPicPr>
+          <p:cNvPr id="41" name="Graphic 40">
+            <a:extLst>
+              <a:ext uri="{FF2B5EF4-FFF2-40B4-BE49-F238E27FC236}">
+                <a16:creationId xmlns:a16="http://schemas.microsoft.com/office/drawing/2014/main" id="{8BD0806B-43F4-4F5B-08B4-2479482222DB}"/>
+              </a:ext>
+            </a:extLst>
+          </p:cNvPr>
+          <p:cNvPicPr>
+            <a:picLocks noChangeAspect="1"/>
+          </p:cNvPicPr>
+          <p:nvPr/>
+        </p:nvPicPr>
+        <p:blipFill>
+          <a:blip r:embed="rId20">
+            <a:extLst>
+              <a:ext uri="{96DAC541-7B7A-43D3-8B79-37D633B846F1}">
+                <asvg:svgBlip xmlns:asvg="http://schemas.microsoft.com/office/drawing/2016/SVG/main" r:embed="rId21"/>
+              </a:ext>
+            </a:extLst>
+          </a:blip>
+          <a:stretch>
+            <a:fillRect/>
+          </a:stretch>
+        </p:blipFill>
+        <p:spPr>
+          <a:xfrm>
+            <a:off x="12905759" y="52381"/>
+            <a:ext cx="892053" cy="483195"/>
           </a:xfrm>
           <a:prstGeom prst="rect">
             <a:avLst/>
           </a:prstGeom>
-          <a:noFill/>
-        </p:spPr>
-        <p:txBody>
-          <a:bodyPr wrap="square" rtlCol="0">
-            <a:spAutoFit/>
-          </a:bodyPr>
-          <a:lstStyle/>
-          <a:p>
-            <a:pPr algn="ctr"/>
-            <a:r>
-              <a:rPr lang="en-GB" sz="3500" b="1" i="1" dirty="0">
-                <a:latin typeface="CMU Serif BoldItalic" panose="02000603000000000000" pitchFamily="2" charset="0"/>
-                <a:ea typeface="CMU Serif BoldItalic" panose="02000603000000000000" pitchFamily="2" charset="0"/>
-                <a:cs typeface="CMU Serif BoldItalic" panose="02000603000000000000" pitchFamily="2" charset="0"/>
-              </a:rPr>
-              <a:t>=</a:t>
-            </a:r>
-          </a:p>
-        </p:txBody>
-      </p:sp>
-      <p:sp>
-        <p:nvSpPr>
-          <p:cNvPr id="10" name="TextBox 9">
-            <a:extLst>
-              <a:ext uri="{FF2B5EF4-FFF2-40B4-BE49-F238E27FC236}">
-                <a16:creationId xmlns:a16="http://schemas.microsoft.com/office/drawing/2014/main" id="{4D3E3EC1-F297-4ABE-78AD-BA3023C010C9}"/>
-              </a:ext>
-            </a:extLst>
-          </p:cNvPr>
-          <p:cNvSpPr txBox="1"/>
-          <p:nvPr/>
-        </p:nvSpPr>
-        <p:spPr>
-          <a:xfrm>
-            <a:off x="7315296" y="392107"/>
-            <a:ext cx="636997" cy="630942"/>
-          </a:xfrm>
-          <a:prstGeom prst="rect">
-            <a:avLst/>
-          </a:prstGeom>
-          <a:noFill/>
-        </p:spPr>
-        <p:txBody>
-          <a:bodyPr wrap="square" rtlCol="0">
-            <a:spAutoFit/>
-          </a:bodyPr>
-          <a:lstStyle/>
-          <a:p>
-            <a:pPr algn="ctr"/>
-            <a:r>
-              <a:rPr lang="en-GB" sz="3500" b="1" i="1" dirty="0">
-                <a:latin typeface="CMU Serif BoldItalic" panose="02000603000000000000" pitchFamily="2" charset="0"/>
-                <a:ea typeface="CMU Serif BoldItalic" panose="02000603000000000000" pitchFamily="2" charset="0"/>
-                <a:cs typeface="CMU Serif BoldItalic" panose="02000603000000000000" pitchFamily="2" charset="0"/>
-              </a:rPr>
-              <a:t>+</a:t>
-            </a:r>
-          </a:p>
-        </p:txBody>
-      </p:sp>
-      <p:sp>
-        <p:nvSpPr>
-          <p:cNvPr id="12" name="TextBox 11">
-            <a:extLst>
-              <a:ext uri="{FF2B5EF4-FFF2-40B4-BE49-F238E27FC236}">
-                <a16:creationId xmlns:a16="http://schemas.microsoft.com/office/drawing/2014/main" id="{EB35F483-3FEC-19FE-58E0-DE0D1DDAA1E9}"/>
-              </a:ext>
-            </a:extLst>
-          </p:cNvPr>
-          <p:cNvSpPr txBox="1"/>
-          <p:nvPr/>
-        </p:nvSpPr>
-        <p:spPr>
-          <a:xfrm>
-            <a:off x="14453000" y="378395"/>
-            <a:ext cx="636997" cy="630942"/>
-          </a:xfrm>
-          <a:prstGeom prst="rect">
-            <a:avLst/>
-          </a:prstGeom>
-          <a:noFill/>
-        </p:spPr>
-        <p:txBody>
-          <a:bodyPr wrap="square" rtlCol="0">
-            <a:spAutoFit/>
-          </a:bodyPr>
-          <a:lstStyle/>
-          <a:p>
-            <a:pPr algn="ctr"/>
-            <a:r>
-              <a:rPr lang="en-GB" sz="3500" b="1" i="1" dirty="0">
-                <a:latin typeface="CMU Serif BoldItalic" panose="02000603000000000000" pitchFamily="2" charset="0"/>
-                <a:ea typeface="CMU Serif BoldItalic" panose="02000603000000000000" pitchFamily="2" charset="0"/>
-                <a:cs typeface="CMU Serif BoldItalic" panose="02000603000000000000" pitchFamily="2" charset="0"/>
-              </a:rPr>
-              <a:t>+</a:t>
-            </a:r>
-          </a:p>
-        </p:txBody>
-      </p:sp>
+        </p:spPr>
+      </p:pic>
     </p:spTree>
     <p:extLst>
       <p:ext uri="{BB962C8B-B14F-4D97-AF65-F5344CB8AC3E}">

</xml_diff>

<commit_message>
final change to diagram?
</commit_message>
<xml_diff>
--- a/figures/fmm-diagram.pptx
+++ b/figures/fmm-diagram.pptx
@@ -2996,7 +2996,7 @@
         <p:spPr>
           <a:xfrm>
             <a:off x="12508558" y="996744"/>
-            <a:ext cx="2082838" cy="2082838"/>
+            <a:ext cx="2084400" cy="2084400"/>
           </a:xfrm>
           <a:prstGeom prst="rect">
             <a:avLst/>
@@ -3005,10 +3005,10 @@
       </p:pic>
       <p:pic>
         <p:nvPicPr>
-          <p:cNvPr id="44" name="Picture 43">
-            <a:extLst>
-              <a:ext uri="{FF2B5EF4-FFF2-40B4-BE49-F238E27FC236}">
-                <a16:creationId xmlns:a16="http://schemas.microsoft.com/office/drawing/2014/main" id="{8CFFE07C-3AA1-E761-8AFB-09195406D6AB}"/>
+          <p:cNvPr id="15" name="Picture 14">
+            <a:extLst>
+              <a:ext uri="{FF2B5EF4-FFF2-40B4-BE49-F238E27FC236}">
+                <a16:creationId xmlns:a16="http://schemas.microsoft.com/office/drawing/2014/main" id="{532409A3-0120-15B4-57C1-3DEDF37F02CF}"/>
               </a:ext>
             </a:extLst>
           </p:cNvPr>
@@ -3025,8 +3025,8 @@
         </p:blipFill>
         <p:spPr>
           <a:xfrm>
-            <a:off x="15690639" y="1352896"/>
-            <a:ext cx="2083818" cy="2083818"/>
+            <a:off x="441375" y="1174881"/>
+            <a:ext cx="2084400" cy="2084400"/>
           </a:xfrm>
           <a:prstGeom prst="rect">
             <a:avLst/>
@@ -3035,10 +3035,10 @@
       </p:pic>
       <p:pic>
         <p:nvPicPr>
-          <p:cNvPr id="51" name="Picture 50">
-            <a:extLst>
-              <a:ext uri="{FF2B5EF4-FFF2-40B4-BE49-F238E27FC236}">
-                <a16:creationId xmlns:a16="http://schemas.microsoft.com/office/drawing/2014/main" id="{0D90282C-7DEF-083D-BB27-7521F4BEC39E}"/>
+          <p:cNvPr id="44" name="Picture 43">
+            <a:extLst>
+              <a:ext uri="{FF2B5EF4-FFF2-40B4-BE49-F238E27FC236}">
+                <a16:creationId xmlns:a16="http://schemas.microsoft.com/office/drawing/2014/main" id="{8CFFE07C-3AA1-E761-8AFB-09195406D6AB}"/>
               </a:ext>
             </a:extLst>
           </p:cNvPr>
@@ -3055,7 +3055,7 @@
         </p:blipFill>
         <p:spPr>
           <a:xfrm>
-            <a:off x="15678822" y="4894947"/>
+            <a:off x="15690639" y="1352896"/>
             <a:ext cx="2083818" cy="2083818"/>
           </a:xfrm>
           <a:prstGeom prst="rect">
@@ -3065,10 +3065,10 @@
       </p:pic>
       <p:pic>
         <p:nvPicPr>
-          <p:cNvPr id="53" name="Picture 52">
-            <a:extLst>
-              <a:ext uri="{FF2B5EF4-FFF2-40B4-BE49-F238E27FC236}">
-                <a16:creationId xmlns:a16="http://schemas.microsoft.com/office/drawing/2014/main" id="{43D03433-F1A1-9B01-881B-F31F6A46443F}"/>
+          <p:cNvPr id="51" name="Picture 50">
+            <a:extLst>
+              <a:ext uri="{FF2B5EF4-FFF2-40B4-BE49-F238E27FC236}">
+                <a16:creationId xmlns:a16="http://schemas.microsoft.com/office/drawing/2014/main" id="{0D90282C-7DEF-083D-BB27-7521F4BEC39E}"/>
               </a:ext>
             </a:extLst>
           </p:cNvPr>
@@ -3085,7 +3085,67 @@
         </p:blipFill>
         <p:spPr>
           <a:xfrm>
+            <a:off x="15678822" y="4894947"/>
+            <a:ext cx="2083818" cy="2083818"/>
+          </a:xfrm>
+          <a:prstGeom prst="rect">
+            <a:avLst/>
+          </a:prstGeom>
+        </p:spPr>
+      </p:pic>
+      <p:pic>
+        <p:nvPicPr>
+          <p:cNvPr id="53" name="Picture 52">
+            <a:extLst>
+              <a:ext uri="{FF2B5EF4-FFF2-40B4-BE49-F238E27FC236}">
+                <a16:creationId xmlns:a16="http://schemas.microsoft.com/office/drawing/2014/main" id="{43D03433-F1A1-9B01-881B-F31F6A46443F}"/>
+              </a:ext>
+            </a:extLst>
+          </p:cNvPr>
+          <p:cNvPicPr>
+            <a:picLocks noChangeAspect="1"/>
+          </p:cNvPicPr>
+          <p:nvPr/>
+        </p:nvPicPr>
+        <p:blipFill>
+          <a:blip r:embed="rId6"/>
+          <a:stretch>
+            <a:fillRect/>
+          </a:stretch>
+        </p:blipFill>
+        <p:spPr>
+          <a:xfrm>
             <a:off x="15613225" y="6061456"/>
+            <a:ext cx="2083818" cy="2083818"/>
+          </a:xfrm>
+          <a:prstGeom prst="rect">
+            <a:avLst/>
+          </a:prstGeom>
+        </p:spPr>
+      </p:pic>
+      <p:pic>
+        <p:nvPicPr>
+          <p:cNvPr id="17" name="Picture 16">
+            <a:extLst>
+              <a:ext uri="{FF2B5EF4-FFF2-40B4-BE49-F238E27FC236}">
+                <a16:creationId xmlns:a16="http://schemas.microsoft.com/office/drawing/2014/main" id="{718122D5-497F-1466-A555-DB1C47455024}"/>
+              </a:ext>
+            </a:extLst>
+          </p:cNvPr>
+          <p:cNvPicPr>
+            <a:picLocks noChangeAspect="1"/>
+          </p:cNvPicPr>
+          <p:nvPr/>
+        </p:nvPicPr>
+        <p:blipFill>
+          <a:blip r:embed="rId7"/>
+          <a:stretch>
+            <a:fillRect/>
+          </a:stretch>
+        </p:blipFill>
+        <p:spPr>
+          <a:xfrm>
+            <a:off x="441300" y="2138952"/>
             <a:ext cx="2083818" cy="2083818"/>
           </a:xfrm>
           <a:prstGeom prst="rect">
@@ -3108,10 +3168,10 @@
           <p:nvPr/>
         </p:nvPicPr>
         <p:blipFill>
-          <a:blip r:embed="rId6">
+          <a:blip r:embed="rId8">
             <a:extLst>
               <a:ext uri="{96DAC541-7B7A-43D3-8B79-37D633B846F1}">
-                <asvg:svgBlip xmlns:asvg="http://schemas.microsoft.com/office/drawing/2016/SVG/main" r:embed="rId7"/>
+                <asvg:svgBlip xmlns:asvg="http://schemas.microsoft.com/office/drawing/2016/SVG/main" r:embed="rId9"/>
               </a:ext>
             </a:extLst>
           </a:blip>
@@ -3123,66 +3183,6 @@
           <a:xfrm>
             <a:off x="16369283" y="260392"/>
             <a:ext cx="892053" cy="527122"/>
-          </a:xfrm>
-          <a:prstGeom prst="rect">
-            <a:avLst/>
-          </a:prstGeom>
-        </p:spPr>
-      </p:pic>
-      <p:pic>
-        <p:nvPicPr>
-          <p:cNvPr id="15" name="Picture 14">
-            <a:extLst>
-              <a:ext uri="{FF2B5EF4-FFF2-40B4-BE49-F238E27FC236}">
-                <a16:creationId xmlns:a16="http://schemas.microsoft.com/office/drawing/2014/main" id="{532409A3-0120-15B4-57C1-3DEDF37F02CF}"/>
-              </a:ext>
-            </a:extLst>
-          </p:cNvPr>
-          <p:cNvPicPr>
-            <a:picLocks noChangeAspect="1"/>
-          </p:cNvPicPr>
-          <p:nvPr/>
-        </p:nvPicPr>
-        <p:blipFill>
-          <a:blip r:embed="rId8"/>
-          <a:stretch>
-            <a:fillRect/>
-          </a:stretch>
-        </p:blipFill>
-        <p:spPr>
-          <a:xfrm>
-            <a:off x="441375" y="1174881"/>
-            <a:ext cx="2083818" cy="2083818"/>
-          </a:xfrm>
-          <a:prstGeom prst="rect">
-            <a:avLst/>
-          </a:prstGeom>
-        </p:spPr>
-      </p:pic>
-      <p:pic>
-        <p:nvPicPr>
-          <p:cNvPr id="17" name="Picture 16">
-            <a:extLst>
-              <a:ext uri="{FF2B5EF4-FFF2-40B4-BE49-F238E27FC236}">
-                <a16:creationId xmlns:a16="http://schemas.microsoft.com/office/drawing/2014/main" id="{718122D5-497F-1466-A555-DB1C47455024}"/>
-              </a:ext>
-            </a:extLst>
-          </p:cNvPr>
-          <p:cNvPicPr>
-            <a:picLocks noChangeAspect="1"/>
-          </p:cNvPicPr>
-          <p:nvPr/>
-        </p:nvPicPr>
-        <p:blipFill>
-          <a:blip r:embed="rId9"/>
-          <a:stretch>
-            <a:fillRect/>
-          </a:stretch>
-        </p:blipFill>
-        <p:spPr>
-          <a:xfrm>
-            <a:off x="441300" y="2138952"/>
-            <a:ext cx="2083818" cy="2083818"/>
           </a:xfrm>
           <a:prstGeom prst="rect">
             <a:avLst/>
@@ -3443,8 +3443,8 @@
         </p:nvSpPr>
         <p:spPr>
           <a:xfrm>
-            <a:off x="15793068" y="1715936"/>
-            <a:ext cx="522514" cy="5841310"/>
+            <a:off x="15793068" y="1626633"/>
+            <a:ext cx="522514" cy="5930613"/>
           </a:xfrm>
           <a:prstGeom prst="leftBracket">
             <a:avLst/>
@@ -3488,8 +3488,8 @@
         </p:nvSpPr>
         <p:spPr>
           <a:xfrm flipH="1">
-            <a:off x="17231675" y="1715937"/>
-            <a:ext cx="522513" cy="5841318"/>
+            <a:off x="17231674" y="1626634"/>
+            <a:ext cx="522513" cy="5930621"/>
           </a:xfrm>
           <a:prstGeom prst="leftBracket">
             <a:avLst/>
@@ -3632,7 +3632,7 @@
         </p:nvSpPr>
         <p:spPr>
           <a:xfrm>
-            <a:off x="3471636" y="2092395"/>
+            <a:off x="3435204" y="2092395"/>
             <a:ext cx="616449" cy="630942"/>
           </a:xfrm>
           <a:prstGeom prst="rect">
@@ -3672,7 +3672,7 @@
         </p:nvSpPr>
         <p:spPr>
           <a:xfrm>
-            <a:off x="3612198" y="3879750"/>
+            <a:off x="3575766" y="3879750"/>
             <a:ext cx="163592" cy="1477328"/>
           </a:xfrm>
           <a:prstGeom prst="rect">
@@ -3731,7 +3731,7 @@
         </p:nvSpPr>
         <p:spPr>
           <a:xfrm>
-            <a:off x="3472524" y="6887131"/>
+            <a:off x="3436092" y="6887131"/>
             <a:ext cx="616449" cy="630942"/>
           </a:xfrm>
           <a:prstGeom prst="rect">
@@ -3771,7 +3771,7 @@
         </p:nvSpPr>
         <p:spPr>
           <a:xfrm>
-            <a:off x="4288341" y="2092395"/>
+            <a:off x="4251909" y="2092395"/>
             <a:ext cx="988963" cy="630942"/>
           </a:xfrm>
           <a:prstGeom prst="rect">
@@ -3814,7 +3814,7 @@
         </p:nvSpPr>
         <p:spPr>
           <a:xfrm>
-            <a:off x="4759566" y="3847371"/>
+            <a:off x="4723134" y="3847371"/>
             <a:ext cx="179265" cy="1477328"/>
           </a:xfrm>
           <a:prstGeom prst="rect">
@@ -3882,7 +3882,7 @@
         </p:nvSpPr>
         <p:spPr>
           <a:xfrm>
-            <a:off x="4362502" y="6887131"/>
+            <a:off x="4326070" y="6887131"/>
             <a:ext cx="878149" cy="630942"/>
           </a:xfrm>
           <a:prstGeom prst="rect">
@@ -4191,7 +4191,7 @@
         </p:nvSpPr>
         <p:spPr>
           <a:xfrm>
-            <a:off x="3463081" y="2942940"/>
+            <a:off x="3426649" y="2942940"/>
             <a:ext cx="616449" cy="630942"/>
           </a:xfrm>
           <a:prstGeom prst="rect">
@@ -4231,7 +4231,7 @@
         </p:nvSpPr>
         <p:spPr>
           <a:xfrm>
-            <a:off x="4362500" y="2942940"/>
+            <a:off x="4326068" y="2942940"/>
             <a:ext cx="830738" cy="630942"/>
           </a:xfrm>
           <a:prstGeom prst="rect">
@@ -4274,7 +4274,7 @@
         </p:nvSpPr>
         <p:spPr>
           <a:xfrm>
-            <a:off x="3479539" y="5893780"/>
+            <a:off x="3443107" y="5893780"/>
             <a:ext cx="616449" cy="630942"/>
           </a:xfrm>
           <a:prstGeom prst="rect">
@@ -4314,7 +4314,7 @@
         </p:nvSpPr>
         <p:spPr>
           <a:xfrm>
-            <a:off x="4307945" y="5893780"/>
+            <a:off x="4271513" y="5893780"/>
             <a:ext cx="953458" cy="630942"/>
           </a:xfrm>
           <a:prstGeom prst="rect">
@@ -5850,7 +5850,7 @@
           <a:ln w="12700">
             <a:solidFill>
               <a:schemeClr val="bg2">
-                <a:lumMod val="25000"/>
+                <a:lumMod val="50000"/>
               </a:schemeClr>
             </a:solidFill>
           </a:ln>
@@ -5898,8 +5898,8 @@
         </p:nvSpPr>
         <p:spPr>
           <a:xfrm rot="5400000">
-            <a:off x="6396235" y="385578"/>
-            <a:ext cx="401565" cy="1765534"/>
+            <a:off x="6388930" y="380800"/>
+            <a:ext cx="401565" cy="1780145"/>
           </a:xfrm>
           <a:prstGeom prst="leftBrace">
             <a:avLst>
@@ -5910,7 +5910,7 @@
           <a:ln w="12700">
             <a:solidFill>
               <a:schemeClr val="bg2">
-                <a:lumMod val="25000"/>
+                <a:lumMod val="50000"/>
               </a:schemeClr>
             </a:solidFill>
           </a:ln>
@@ -5958,8 +5958,8 @@
         </p:nvSpPr>
         <p:spPr>
           <a:xfrm rot="5400000">
-            <a:off x="10243497" y="-775795"/>
-            <a:ext cx="401565" cy="4094880"/>
+            <a:off x="10226658" y="-775794"/>
+            <a:ext cx="401565" cy="4094882"/>
           </a:xfrm>
           <a:prstGeom prst="leftBrace">
             <a:avLst>
@@ -5970,7 +5970,7 @@
           <a:ln w="12700">
             <a:solidFill>
               <a:schemeClr val="bg2">
-                <a:lumMod val="25000"/>
+                <a:lumMod val="50000"/>
               </a:schemeClr>
             </a:solidFill>
           </a:ln>
@@ -6018,8 +6018,8 @@
         </p:nvSpPr>
         <p:spPr>
           <a:xfrm rot="5400000">
-            <a:off x="4176996" y="116934"/>
-            <a:ext cx="401565" cy="2293835"/>
+            <a:off x="4092925" y="123208"/>
+            <a:ext cx="401565" cy="2281287"/>
           </a:xfrm>
           <a:prstGeom prst="leftBrace">
             <a:avLst>
@@ -6030,7 +6030,7 @@
           <a:ln w="12700">
             <a:solidFill>
               <a:schemeClr val="bg2">
-                <a:lumMod val="25000"/>
+                <a:lumMod val="50000"/>
               </a:schemeClr>
             </a:solidFill>
           </a:ln>
@@ -6054,7 +6054,7 @@
           <a:lstStyle/>
           <a:p>
             <a:pPr algn="ctr"/>
-            <a:endParaRPr lang="en-GB">
+            <a:endParaRPr lang="en-GB" dirty="0">
               <a:solidFill>
                 <a:schemeClr val="bg2">
                   <a:lumMod val="50000"/>
@@ -6078,7 +6078,7 @@
         </p:nvSpPr>
         <p:spPr>
           <a:xfrm rot="5400000">
-            <a:off x="16577072" y="211321"/>
+            <a:off x="16577072" y="273062"/>
             <a:ext cx="401565" cy="1969571"/>
           </a:xfrm>
           <a:prstGeom prst="leftBrace">
@@ -6090,7 +6090,7 @@
           <a:ln w="12700">
             <a:solidFill>
               <a:schemeClr val="bg2">
-                <a:lumMod val="25000"/>
+                <a:lumMod val="50000"/>
               </a:schemeClr>
             </a:solidFill>
           </a:ln>
@@ -6114,7 +6114,7 @@
           <a:lstStyle/>
           <a:p>
             <a:pPr algn="ctr"/>
-            <a:endParaRPr lang="en-GB">
+            <a:endParaRPr lang="en-GB" dirty="0">
               <a:solidFill>
                 <a:schemeClr val="bg2">
                   <a:lumMod val="50000"/>

</xml_diff>